<commit_message>
Final PPT Malka 50330001
</commit_message>
<xml_diff>
--- a/Presentation/ppt.pptx
+++ b/Presentation/ppt.pptx
@@ -109,6 +109,11 @@
       </a:defRPr>
     </a:lvl9pPr>
   </p:defaultTextStyle>
+  <p:extLst>
+    <p:ext uri="{EFAFB233-063F-42B5-8137-9DF3F51BA10A}">
+      <p15:sldGuideLst xmlns:p15="http://schemas.microsoft.com/office/powerpoint/2012/main"/>
+    </p:ext>
+  </p:extLst>
 </p:presentation>
 </file>
 
@@ -298,7 +303,7 @@
           <a:p>
             <a:fld id="{F9E423C3-3C51-4698-87BA-8A1B94DDD9E9}" type="datetimeFigureOut">
               <a:rPr lang="en-US" smtClean="0"/>
-              <a:t>2/9/2024</a:t>
+              <a:t>4/29/2024</a:t>
             </a:fld>
             <a:endParaRPr lang="en-US"/>
           </a:p>
@@ -573,7 +578,7 @@
           <a:p>
             <a:fld id="{F9E423C3-3C51-4698-87BA-8A1B94DDD9E9}" type="datetimeFigureOut">
               <a:rPr lang="en-US" smtClean="0"/>
-              <a:t>2/9/2024</a:t>
+              <a:t>4/29/2024</a:t>
             </a:fld>
             <a:endParaRPr lang="en-US"/>
           </a:p>
@@ -767,7 +772,7 @@
           <a:p>
             <a:fld id="{F9E423C3-3C51-4698-87BA-8A1B94DDD9E9}" type="datetimeFigureOut">
               <a:rPr lang="en-US" smtClean="0"/>
-              <a:t>2/9/2024</a:t>
+              <a:t>4/29/2024</a:t>
             </a:fld>
             <a:endParaRPr lang="en-US"/>
           </a:p>
@@ -1040,7 +1045,7 @@
           <a:p>
             <a:fld id="{F9E423C3-3C51-4698-87BA-8A1B94DDD9E9}" type="datetimeFigureOut">
               <a:rPr lang="en-US" smtClean="0"/>
-              <a:t>2/9/2024</a:t>
+              <a:t>4/29/2024</a:t>
             </a:fld>
             <a:endParaRPr lang="en-US"/>
           </a:p>
@@ -1381,7 +1386,7 @@
           <a:p>
             <a:fld id="{F9E423C3-3C51-4698-87BA-8A1B94DDD9E9}" type="datetimeFigureOut">
               <a:rPr lang="en-US" smtClean="0"/>
-              <a:t>2/9/2024</a:t>
+              <a:t>4/29/2024</a:t>
             </a:fld>
             <a:endParaRPr lang="en-US"/>
           </a:p>
@@ -2004,7 +2009,7 @@
           <a:p>
             <a:fld id="{F9E423C3-3C51-4698-87BA-8A1B94DDD9E9}" type="datetimeFigureOut">
               <a:rPr lang="en-US" smtClean="0"/>
-              <a:t>2/9/2024</a:t>
+              <a:t>4/29/2024</a:t>
             </a:fld>
             <a:endParaRPr lang="en-US"/>
           </a:p>
@@ -2864,7 +2869,7 @@
           <a:p>
             <a:fld id="{F9E423C3-3C51-4698-87BA-8A1B94DDD9E9}" type="datetimeFigureOut">
               <a:rPr lang="en-US" smtClean="0"/>
-              <a:t>2/9/2024</a:t>
+              <a:t>4/29/2024</a:t>
             </a:fld>
             <a:endParaRPr lang="en-US"/>
           </a:p>
@@ -3034,7 +3039,7 @@
           <a:p>
             <a:fld id="{F9E423C3-3C51-4698-87BA-8A1B94DDD9E9}" type="datetimeFigureOut">
               <a:rPr lang="en-US" smtClean="0"/>
-              <a:t>2/9/2024</a:t>
+              <a:t>4/29/2024</a:t>
             </a:fld>
             <a:endParaRPr lang="en-US"/>
           </a:p>
@@ -3214,7 +3219,7 @@
           <a:p>
             <a:fld id="{F9E423C3-3C51-4698-87BA-8A1B94DDD9E9}" type="datetimeFigureOut">
               <a:rPr lang="en-US" smtClean="0"/>
-              <a:t>2/9/2024</a:t>
+              <a:t>4/29/2024</a:t>
             </a:fld>
             <a:endParaRPr lang="en-US"/>
           </a:p>
@@ -3384,7 +3389,7 @@
           <a:p>
             <a:fld id="{F9E423C3-3C51-4698-87BA-8A1B94DDD9E9}" type="datetimeFigureOut">
               <a:rPr lang="en-US" smtClean="0"/>
-              <a:t>2/9/2024</a:t>
+              <a:t>4/29/2024</a:t>
             </a:fld>
             <a:endParaRPr lang="en-US"/>
           </a:p>
@@ -3631,7 +3636,7 @@
           <a:p>
             <a:fld id="{F9E423C3-3C51-4698-87BA-8A1B94DDD9E9}" type="datetimeFigureOut">
               <a:rPr lang="en-US" smtClean="0"/>
-              <a:t>2/9/2024</a:t>
+              <a:t>4/29/2024</a:t>
             </a:fld>
             <a:endParaRPr lang="en-US"/>
           </a:p>
@@ -3923,7 +3928,7 @@
           <a:p>
             <a:fld id="{F9E423C3-3C51-4698-87BA-8A1B94DDD9E9}" type="datetimeFigureOut">
               <a:rPr lang="en-US" smtClean="0"/>
-              <a:t>2/9/2024</a:t>
+              <a:t>4/29/2024</a:t>
             </a:fld>
             <a:endParaRPr lang="en-US"/>
           </a:p>
@@ -4367,7 +4372,7 @@
           <a:p>
             <a:fld id="{F9E423C3-3C51-4698-87BA-8A1B94DDD9E9}" type="datetimeFigureOut">
               <a:rPr lang="en-US" smtClean="0"/>
-              <a:t>2/9/2024</a:t>
+              <a:t>4/29/2024</a:t>
             </a:fld>
             <a:endParaRPr lang="en-US"/>
           </a:p>
@@ -4485,7 +4490,7 @@
           <a:p>
             <a:fld id="{F9E423C3-3C51-4698-87BA-8A1B94DDD9E9}" type="datetimeFigureOut">
               <a:rPr lang="en-US" smtClean="0"/>
-              <a:t>2/9/2024</a:t>
+              <a:t>4/29/2024</a:t>
             </a:fld>
             <a:endParaRPr lang="en-US"/>
           </a:p>
@@ -4580,7 +4585,7 @@
           <a:p>
             <a:fld id="{F9E423C3-3C51-4698-87BA-8A1B94DDD9E9}" type="datetimeFigureOut">
               <a:rPr lang="en-US" smtClean="0"/>
-              <a:t>2/9/2024</a:t>
+              <a:t>4/29/2024</a:t>
             </a:fld>
             <a:endParaRPr lang="en-US"/>
           </a:p>
@@ -4859,7 +4864,7 @@
           <a:p>
             <a:fld id="{F9E423C3-3C51-4698-87BA-8A1B94DDD9E9}" type="datetimeFigureOut">
               <a:rPr lang="en-US" smtClean="0"/>
-              <a:t>2/9/2024</a:t>
+              <a:t>4/29/2024</a:t>
             </a:fld>
             <a:endParaRPr lang="en-US"/>
           </a:p>
@@ -5134,7 +5139,7 @@
           <a:p>
             <a:fld id="{F9E423C3-3C51-4698-87BA-8A1B94DDD9E9}" type="datetimeFigureOut">
               <a:rPr lang="en-US" smtClean="0"/>
-              <a:t>2/9/2024</a:t>
+              <a:t>4/29/2024</a:t>
             </a:fld>
             <a:endParaRPr lang="en-US"/>
           </a:p>
@@ -5563,7 +5568,7 @@
           <a:p>
             <a:fld id="{F9E423C3-3C51-4698-87BA-8A1B94DDD9E9}" type="datetimeFigureOut">
               <a:rPr lang="en-US" smtClean="0"/>
-              <a:t>2/9/2024</a:t>
+              <a:t>4/29/2024</a:t>
             </a:fld>
             <a:endParaRPr lang="en-US"/>
           </a:p>
@@ -6120,13 +6125,13 @@
           <a:lstStyle/>
           <a:p>
             <a:br>
-              <a:rPr lang="en-IN" b="0" i="0" dirty="0">
+              <a:rPr lang="en-IN" b="0" i="0">
                 <a:effectLst/>
                 <a:latin typeface="Söhne"/>
               </a:rPr>
             </a:br>
             <a:r>
-              <a:rPr lang="en-IN" sz="6000" b="0" i="0" dirty="0">
+              <a:rPr lang="en-IN" sz="6000" b="0" i="0">
                 <a:effectLst/>
                 <a:latin typeface="Times New Roman" panose="02020603050405020304" pitchFamily="18" charset="0"/>
                 <a:cs typeface="Times New Roman" panose="02020603050405020304" pitchFamily="18" charset="0"/>
@@ -6134,14 +6139,14 @@
               <a:t>Advancements in Forest Fire Prediction</a:t>
             </a:r>
             <a:br>
-              <a:rPr lang="en-IN" sz="6000" b="0" i="0" dirty="0">
+              <a:rPr lang="en-IN" sz="6000" b="0" i="0">
                 <a:effectLst/>
                 <a:latin typeface="Times New Roman" panose="02020603050405020304" pitchFamily="18" charset="0"/>
                 <a:cs typeface="Times New Roman" panose="02020603050405020304" pitchFamily="18" charset="0"/>
               </a:rPr>
             </a:br>
             <a:r>
-              <a:rPr lang="en-IN" sz="6000" b="0" i="0" dirty="0">
+              <a:rPr lang="en-IN" sz="6000" b="0" i="0">
                 <a:effectLst/>
                 <a:latin typeface="Times New Roman" panose="02020603050405020304" pitchFamily="18" charset="0"/>
                 <a:cs typeface="Times New Roman" panose="02020603050405020304" pitchFamily="18" charset="0"/>

</xml_diff>